<commit_message>
ajout rapport et présentation
</commit_message>
<xml_diff>
--- a/[Option Recherche documentaire]Presentation_FARDILHA_PILLIE.pptx
+++ b/[Option Recherche documentaire]Presentation_FARDILHA_PILLIE.pptx
@@ -205,7 +205,7 @@
           <a:p>
             <a:fld id="{71B99083-2699-45BF-85B8-3B86E730FDB8}" type="datetimeFigureOut">
               <a:rPr lang="fr-FR" smtClean="0"/>
-              <a:t>03/06/2014</a:t>
+              <a:t>04/06/2014</a:t>
             </a:fld>
             <a:endParaRPr lang="fr-FR"/>
           </a:p>
@@ -3314,7 +3314,7 @@
           <a:p>
             <a:fld id="{FDE2B709-1384-4B8B-A9FB-0256DC6F1071}" type="datetimeFigureOut">
               <a:rPr lang="fr-FR" smtClean="0"/>
-              <a:t>03/06/2014</a:t>
+              <a:t>04/06/2014</a:t>
             </a:fld>
             <a:endParaRPr lang="fr-FR"/>
           </a:p>
@@ -3599,7 +3599,7 @@
           <a:p>
             <a:fld id="{FDE2B709-1384-4B8B-A9FB-0256DC6F1071}" type="datetimeFigureOut">
               <a:rPr lang="fr-FR" smtClean="0"/>
-              <a:t>03/06/2014</a:t>
+              <a:t>04/06/2014</a:t>
             </a:fld>
             <a:endParaRPr lang="fr-FR"/>
           </a:p>
@@ -3774,7 +3774,7 @@
           <a:p>
             <a:fld id="{FDE2B709-1384-4B8B-A9FB-0256DC6F1071}" type="datetimeFigureOut">
               <a:rPr lang="fr-FR" smtClean="0"/>
-              <a:t>03/06/2014</a:t>
+              <a:t>04/06/2014</a:t>
             </a:fld>
             <a:endParaRPr lang="fr-FR"/>
           </a:p>
@@ -3939,7 +3939,7 @@
           <a:p>
             <a:fld id="{FDE2B709-1384-4B8B-A9FB-0256DC6F1071}" type="datetimeFigureOut">
               <a:rPr lang="fr-FR" smtClean="0"/>
-              <a:t>03/06/2014</a:t>
+              <a:t>04/06/2014</a:t>
             </a:fld>
             <a:endParaRPr lang="fr-FR"/>
           </a:p>
@@ -4180,7 +4180,7 @@
           <a:p>
             <a:fld id="{FDE2B709-1384-4B8B-A9FB-0256DC6F1071}" type="datetimeFigureOut">
               <a:rPr lang="fr-FR" smtClean="0"/>
-              <a:t>03/06/2014</a:t>
+              <a:t>04/06/2014</a:t>
             </a:fld>
             <a:endParaRPr lang="fr-FR"/>
           </a:p>
@@ -4293,7 +4293,7 @@
           <a:p>
             <a:fld id="{FDE2B709-1384-4B8B-A9FB-0256DC6F1071}" type="datetimeFigureOut">
               <a:rPr lang="fr-FR" smtClean="0"/>
-              <a:t>03/06/2014</a:t>
+              <a:t>04/06/2014</a:t>
             </a:fld>
             <a:endParaRPr lang="fr-FR"/>
           </a:p>
@@ -4832,7 +4832,7 @@
           <a:p>
             <a:fld id="{FDE2B709-1384-4B8B-A9FB-0256DC6F1071}" type="datetimeFigureOut">
               <a:rPr lang="fr-FR" smtClean="0"/>
-              <a:t>03/06/2014</a:t>
+              <a:t>04/06/2014</a:t>
             </a:fld>
             <a:endParaRPr lang="fr-FR"/>
           </a:p>
@@ -4945,7 +4945,7 @@
           <a:p>
             <a:fld id="{FDE2B709-1384-4B8B-A9FB-0256DC6F1071}" type="datetimeFigureOut">
               <a:rPr lang="fr-FR" smtClean="0"/>
-              <a:t>03/06/2014</a:t>
+              <a:t>04/06/2014</a:t>
             </a:fld>
             <a:endParaRPr lang="fr-FR"/>
           </a:p>
@@ -5035,7 +5035,7 @@
           <a:p>
             <a:fld id="{FDE2B709-1384-4B8B-A9FB-0256DC6F1071}" type="datetimeFigureOut">
               <a:rPr lang="fr-FR" smtClean="0"/>
-              <a:t>03/06/2014</a:t>
+              <a:t>04/06/2014</a:t>
             </a:fld>
             <a:endParaRPr lang="fr-FR"/>
           </a:p>
@@ -7686,7 +7686,7 @@
           <a:p>
             <a:fld id="{FDE2B709-1384-4B8B-A9FB-0256DC6F1071}" type="datetimeFigureOut">
               <a:rPr lang="fr-FR" smtClean="0"/>
-              <a:t>03/06/2014</a:t>
+              <a:t>04/06/2014</a:t>
             </a:fld>
             <a:endParaRPr lang="fr-FR"/>
           </a:p>
@@ -10898,7 +10898,7 @@
           <a:p>
             <a:fld id="{FDE2B709-1384-4B8B-A9FB-0256DC6F1071}" type="datetimeFigureOut">
               <a:rPr lang="fr-FR" smtClean="0"/>
-              <a:t>03/06/2014</a:t>
+              <a:t>04/06/2014</a:t>
             </a:fld>
             <a:endParaRPr lang="fr-FR"/>
           </a:p>
@@ -13720,7 +13720,7 @@
           <a:p>
             <a:fld id="{FDE2B709-1384-4B8B-A9FB-0256DC6F1071}" type="datetimeFigureOut">
               <a:rPr lang="fr-FR" smtClean="0"/>
-              <a:t>03/06/2014</a:t>
+              <a:t>04/06/2014</a:t>
             </a:fld>
             <a:endParaRPr lang="fr-FR"/>
           </a:p>
@@ -15352,14 +15352,6 @@
               </a:rPr>
               <a:t>Algorithme </a:t>
             </a:r>
-            <a:endParaRPr lang="fr-FR" sz="2400" dirty="0">
-              <a:solidFill>
-                <a:schemeClr val="accent3">
-                  <a:lumMod val="40000"/>
-                  <a:lumOff val="60000"/>
-                </a:schemeClr>
-              </a:solidFill>
-            </a:endParaRPr>
           </a:p>
           <a:p>
             <a:pPr marL="342900" indent="-342900">
@@ -15378,18 +15370,7 @@
                   </a:schemeClr>
                 </a:solidFill>
               </a:rPr>
-              <a:t>Résultats </a:t>
-            </a:r>
-            <a:r>
-              <a:rPr lang="fr-FR" sz="2400" dirty="0">
-                <a:solidFill>
-                  <a:schemeClr val="accent3">
-                    <a:lumMod val="40000"/>
-                    <a:lumOff val="60000"/>
-                  </a:schemeClr>
-                </a:solidFill>
-              </a:rPr>
-              <a:t>&amp; performances</a:t>
+              <a:t>Résultats &amp; performances</a:t>
             </a:r>
           </a:p>
           <a:p>
@@ -15431,14 +15412,6 @@
               </a:rPr>
               <a:t>Conclusion</a:t>
             </a:r>
-            <a:endParaRPr lang="fr-FR" sz="2400" dirty="0">
-              <a:solidFill>
-                <a:schemeClr val="accent3">
-                  <a:lumMod val="40000"/>
-                  <a:lumOff val="60000"/>
-                </a:schemeClr>
-              </a:solidFill>
-            </a:endParaRPr>
           </a:p>
         </p:txBody>
       </p:sp>
@@ -16024,14 +15997,6 @@
               </a:rPr>
               <a:t>Algorithme </a:t>
             </a:r>
-            <a:endParaRPr lang="fr-FR" sz="2400" dirty="0">
-              <a:solidFill>
-                <a:schemeClr val="accent3">
-                  <a:lumMod val="40000"/>
-                  <a:lumOff val="60000"/>
-                </a:schemeClr>
-              </a:solidFill>
-            </a:endParaRPr>
           </a:p>
           <a:p>
             <a:pPr marL="342900" indent="-342900">
@@ -16050,18 +16015,7 @@
                   </a:schemeClr>
                 </a:solidFill>
               </a:rPr>
-              <a:t>Résultats </a:t>
-            </a:r>
-            <a:r>
-              <a:rPr lang="fr-FR" sz="2400" dirty="0">
-                <a:solidFill>
-                  <a:schemeClr val="accent3">
-                    <a:lumMod val="40000"/>
-                    <a:lumOff val="60000"/>
-                  </a:schemeClr>
-                </a:solidFill>
-              </a:rPr>
-              <a:t>&amp; performances</a:t>
+              <a:t>Résultats &amp; performances</a:t>
             </a:r>
           </a:p>
           <a:p>
@@ -17707,14 +17661,6 @@
               </a:rPr>
               <a:t>Algorithme </a:t>
             </a:r>
-            <a:endParaRPr lang="fr-FR" sz="2400" dirty="0">
-              <a:solidFill>
-                <a:schemeClr val="accent3">
-                  <a:lumMod val="40000"/>
-                  <a:lumOff val="60000"/>
-                </a:schemeClr>
-              </a:solidFill>
-            </a:endParaRPr>
           </a:p>
           <a:p>
             <a:pPr marL="342900" indent="-342900">
@@ -17733,18 +17679,7 @@
                   </a:schemeClr>
                 </a:solidFill>
               </a:rPr>
-              <a:t>Résultats </a:t>
-            </a:r>
-            <a:r>
-              <a:rPr lang="fr-FR" sz="2400" dirty="0">
-                <a:solidFill>
-                  <a:schemeClr val="accent3">
-                    <a:lumMod val="40000"/>
-                    <a:lumOff val="60000"/>
-                  </a:schemeClr>
-                </a:solidFill>
-              </a:rPr>
-              <a:t>&amp; performances</a:t>
+              <a:t>Résultats &amp; performances</a:t>
             </a:r>
           </a:p>
           <a:p>
@@ -17783,14 +17718,6 @@
               </a:rPr>
               <a:t>Conclusion</a:t>
             </a:r>
-            <a:endParaRPr lang="fr-FR" sz="2400" dirty="0">
-              <a:solidFill>
-                <a:schemeClr val="accent3">
-                  <a:lumMod val="40000"/>
-                  <a:lumOff val="60000"/>
-                </a:schemeClr>
-              </a:solidFill>
-            </a:endParaRPr>
           </a:p>
         </p:txBody>
       </p:sp>
@@ -18461,18 +18388,7 @@
                   </a:schemeClr>
                 </a:solidFill>
               </a:rPr>
-              <a:t>Résultats </a:t>
-            </a:r>
-            <a:r>
-              <a:rPr lang="fr-FR" sz="2400" dirty="0">
-                <a:solidFill>
-                  <a:schemeClr val="accent3">
-                    <a:lumMod val="40000"/>
-                    <a:lumOff val="60000"/>
-                  </a:schemeClr>
-                </a:solidFill>
-              </a:rPr>
-              <a:t>&amp; performances</a:t>
+              <a:t>Résultats &amp; performances</a:t>
             </a:r>
           </a:p>
           <a:p>
@@ -18514,14 +18430,6 @@
               </a:rPr>
               <a:t>Conclusion</a:t>
             </a:r>
-            <a:endParaRPr lang="fr-FR" sz="2400" dirty="0">
-              <a:solidFill>
-                <a:schemeClr val="accent3">
-                  <a:lumMod val="40000"/>
-                  <a:lumOff val="60000"/>
-                </a:schemeClr>
-              </a:solidFill>
-            </a:endParaRPr>
           </a:p>
         </p:txBody>
       </p:sp>
@@ -19135,14 +19043,6 @@
               </a:rPr>
               <a:t>Algorithme </a:t>
             </a:r>
-            <a:endParaRPr lang="fr-FR" sz="2400" dirty="0">
-              <a:solidFill>
-                <a:schemeClr val="accent3">
-                  <a:lumMod val="40000"/>
-                  <a:lumOff val="60000"/>
-                </a:schemeClr>
-              </a:solidFill>
-            </a:endParaRPr>
           </a:p>
           <a:p>
             <a:pPr marL="342900" indent="-342900">
@@ -19214,14 +19114,6 @@
               </a:rPr>
               <a:t>Conclusion</a:t>
             </a:r>
-            <a:endParaRPr lang="fr-FR" sz="2400" dirty="0">
-              <a:solidFill>
-                <a:schemeClr val="accent3">
-                  <a:lumMod val="40000"/>
-                  <a:lumOff val="60000"/>
-                </a:schemeClr>
-              </a:solidFill>
-            </a:endParaRPr>
           </a:p>
         </p:txBody>
       </p:sp>

</xml_diff>